<commit_message>
poster board final version
</commit_message>
<xml_diff>
--- a/www/Newest Air Hockey & Game Table poster.pptx
+++ b/www/Newest Air Hockey & Game Table poster.pptx
@@ -216,7 +216,7 @@
   </p:defaultTextStyle>
   <p:extLst>
     <p:ext uri="{EFAFB233-063F-42B5-8137-9DF3F51BA10A}">
-      <p15:sldGuideLst xmlns:p15="http://schemas.microsoft.com/office/powerpoint/2012/main">
+      <p15:sldGuideLst xmlns:p15="http://schemas.microsoft.com/office/powerpoint/2012/main" xmlns="">
         <p15:guide id="1" orient="horz" pos="10368">
           <p15:clr>
             <a:srgbClr val="A4A3A4"/>
@@ -1887,8 +1887,8 @@
         <a:lstStyle/>
         <a:p>
           <a:r>
-            <a:rPr lang="en-US" dirty="0" err="1"/>
-            <a:t>IntelXDK</a:t>
+            <a:rPr lang="en-US" dirty="0" smtClean="0"/>
+            <a:t>Intel XDK</a:t>
           </a:r>
           <a:endParaRPr lang="en-US" dirty="0"/>
         </a:p>
@@ -2389,6 +2389,13 @@
         </dgm:presLayoutVars>
       </dgm:prSet>
       <dgm:spPr/>
+      <dgm:t>
+        <a:bodyPr/>
+        <a:lstStyle/>
+        <a:p>
+          <a:endParaRPr lang="en-US"/>
+        </a:p>
+      </dgm:t>
     </dgm:pt>
     <dgm:pt modelId="{0EE3B70B-9D51-428B-A877-3E64740474B5}" type="pres">
       <dgm:prSet presAssocID="{AD1213E7-CFB5-4EAF-A134-63A0F4D96469}" presName="comp" presStyleCnt="0"/>
@@ -2397,6 +2404,13 @@
     <dgm:pt modelId="{7F059085-9C5A-44C6-BFE2-A1A4CFF6225A}" type="pres">
       <dgm:prSet presAssocID="{AD1213E7-CFB5-4EAF-A134-63A0F4D96469}" presName="box" presStyleLbl="node1" presStyleIdx="0" presStyleCnt="4" custLinFactNeighborX="-532"/>
       <dgm:spPr/>
+      <dgm:t>
+        <a:bodyPr/>
+        <a:lstStyle/>
+        <a:p>
+          <a:endParaRPr lang="en-US"/>
+        </a:p>
+      </dgm:t>
     </dgm:pt>
     <dgm:pt modelId="{8A940C07-6586-4BDE-9E81-6B9DF9DAE52F}" type="pres">
       <dgm:prSet presAssocID="{AD1213E7-CFB5-4EAF-A134-63A0F4D96469}" presName="img" presStyleLbl="fgImgPlace1" presStyleIdx="0" presStyleCnt="4"/>
@@ -2423,6 +2437,13 @@
         </dgm:presLayoutVars>
       </dgm:prSet>
       <dgm:spPr/>
+      <dgm:t>
+        <a:bodyPr/>
+        <a:lstStyle/>
+        <a:p>
+          <a:endParaRPr lang="en-US"/>
+        </a:p>
+      </dgm:t>
     </dgm:pt>
     <dgm:pt modelId="{D93177CD-749F-4A07-8D1D-80E72C4DE495}" type="pres">
       <dgm:prSet presAssocID="{6A321B8C-4234-4666-874F-F448D17894C9}" presName="spacer" presStyleCnt="0"/>
@@ -2435,6 +2456,13 @@
     <dgm:pt modelId="{5C4E1CFD-A5E5-466A-B4D1-BFA0B1F10B1D}" type="pres">
       <dgm:prSet presAssocID="{52B2AE58-D871-42D6-B823-3B14A7F7CCE4}" presName="box" presStyleLbl="node1" presStyleIdx="1" presStyleCnt="4"/>
       <dgm:spPr/>
+      <dgm:t>
+        <a:bodyPr/>
+        <a:lstStyle/>
+        <a:p>
+          <a:endParaRPr lang="en-US"/>
+        </a:p>
+      </dgm:t>
     </dgm:pt>
     <dgm:pt modelId="{BE6CE178-3009-4607-9631-397C3CDE8E4F}" type="pres">
       <dgm:prSet presAssocID="{52B2AE58-D871-42D6-B823-3B14A7F7CCE4}" presName="img" presStyleLbl="fgImgPlace1" presStyleIdx="1" presStyleCnt="4"/>
@@ -2461,6 +2489,13 @@
         </dgm:presLayoutVars>
       </dgm:prSet>
       <dgm:spPr/>
+      <dgm:t>
+        <a:bodyPr/>
+        <a:lstStyle/>
+        <a:p>
+          <a:endParaRPr lang="en-US"/>
+        </a:p>
+      </dgm:t>
     </dgm:pt>
     <dgm:pt modelId="{C2C90A8C-AD64-4611-AAD2-D9D0A51975A5}" type="pres">
       <dgm:prSet presAssocID="{C15677F8-A144-4E87-812F-EE0BE833A922}" presName="spacer" presStyleCnt="0"/>
@@ -2473,6 +2508,13 @@
     <dgm:pt modelId="{F68F1807-3E6D-427F-AB07-12C2D29194B0}" type="pres">
       <dgm:prSet presAssocID="{0E8D9E75-E70F-46E1-917F-43E96B499664}" presName="box" presStyleLbl="node1" presStyleIdx="2" presStyleCnt="4"/>
       <dgm:spPr/>
+      <dgm:t>
+        <a:bodyPr/>
+        <a:lstStyle/>
+        <a:p>
+          <a:endParaRPr lang="en-US"/>
+        </a:p>
+      </dgm:t>
     </dgm:pt>
     <dgm:pt modelId="{DC30CB41-9BB5-4B2A-8EA7-CDA4DB1A7426}" type="pres">
       <dgm:prSet presAssocID="{0E8D9E75-E70F-46E1-917F-43E96B499664}" presName="img" presStyleLbl="fgImgPlace1" presStyleIdx="2" presStyleCnt="4"/>
@@ -2499,6 +2541,13 @@
         </dgm:presLayoutVars>
       </dgm:prSet>
       <dgm:spPr/>
+      <dgm:t>
+        <a:bodyPr/>
+        <a:lstStyle/>
+        <a:p>
+          <a:endParaRPr lang="en-US"/>
+        </a:p>
+      </dgm:t>
     </dgm:pt>
     <dgm:pt modelId="{83843C79-2C54-4DA9-B57D-A2FA833E40AF}" type="pres">
       <dgm:prSet presAssocID="{776BDD80-278D-407C-B79E-5950B092249A}" presName="spacer" presStyleCnt="0"/>
@@ -2511,6 +2560,13 @@
     <dgm:pt modelId="{D9ECE03C-19C2-4E25-AD62-29DFD23C809C}" type="pres">
       <dgm:prSet presAssocID="{7839876F-2A33-40AA-83B8-A47FC9E92675}" presName="box" presStyleLbl="node1" presStyleIdx="3" presStyleCnt="4"/>
       <dgm:spPr/>
+      <dgm:t>
+        <a:bodyPr/>
+        <a:lstStyle/>
+        <a:p>
+          <a:endParaRPr lang="en-US"/>
+        </a:p>
+      </dgm:t>
     </dgm:pt>
     <dgm:pt modelId="{1FF2162B-B65B-4CD6-B745-04348C961AAC}" type="pres">
       <dgm:prSet presAssocID="{7839876F-2A33-40AA-83B8-A47FC9E92675}" presName="img" presStyleLbl="fgImgPlace1" presStyleIdx="3" presStyleCnt="4"/>
@@ -2537,6 +2593,13 @@
         </dgm:presLayoutVars>
       </dgm:prSet>
       <dgm:spPr/>
+      <dgm:t>
+        <a:bodyPr/>
+        <a:lstStyle/>
+        <a:p>
+          <a:endParaRPr lang="en-US"/>
+        </a:p>
+      </dgm:t>
     </dgm:pt>
   </dgm:ptLst>
   <dgm:cxnLst>
@@ -2546,9 +2609,9 @@
     <dgm:cxn modelId="{3E7269E1-0D20-411C-95AA-2BDA43FFED99}" srcId="{D03DE959-787A-4D69-9D1D-AEED56025284}" destId="{52B2AE58-D871-42D6-B823-3B14A7F7CCE4}" srcOrd="1" destOrd="0" parTransId="{8EE4CC4C-D932-4667-92A1-6478251BBCB7}" sibTransId="{C15677F8-A144-4E87-812F-EE0BE833A922}"/>
     <dgm:cxn modelId="{09056450-2554-4807-B8E3-8F8E0D93AF79}" srcId="{7839876F-2A33-40AA-83B8-A47FC9E92675}" destId="{A9D878A8-A33C-433E-BC1D-82F4CC87E55F}" srcOrd="0" destOrd="0" parTransId="{840DD5D3-E58D-4883-81F9-85D723D1DF79}" sibTransId="{F4F16E74-71C6-46FA-B8A7-55BE71D06206}"/>
     <dgm:cxn modelId="{A424524F-3953-4BE7-B68B-03B6F9B6A079}" srcId="{D03DE959-787A-4D69-9D1D-AEED56025284}" destId="{0E8D9E75-E70F-46E1-917F-43E96B499664}" srcOrd="2" destOrd="0" parTransId="{4D8EA54A-6450-478A-994F-01905396CD1F}" sibTransId="{776BDD80-278D-407C-B79E-5950B092249A}"/>
-    <dgm:cxn modelId="{7AAFAA15-A3B7-42E5-95A3-9CFF1D91558F}" srcId="{52B2AE58-D871-42D6-B823-3B14A7F7CCE4}" destId="{3E243F17-71E7-47BB-A8A8-F9166F56ED12}" srcOrd="0" destOrd="0" parTransId="{8720515B-8255-497A-9610-DF8BF844EFCF}" sibTransId="{B3B725E8-73B8-4A88-AD87-F43CC970F07D}"/>
     <dgm:cxn modelId="{35704E03-DD2A-43F0-BD23-9892D9B2DB3A}" type="presOf" srcId="{385040AF-ECB1-4A7F-8EDE-D6D9B508D450}" destId="{76F8B69C-5AA5-4C73-A74B-D9B1AFFD145D}" srcOrd="1" destOrd="3" presId="urn:microsoft.com/office/officeart/2005/8/layout/vList4"/>
     <dgm:cxn modelId="{2F6EBC1D-8AC0-4ADF-8CE1-07D3620F031C}" type="presOf" srcId="{AD1213E7-CFB5-4EAF-A134-63A0F4D96469}" destId="{FE28D174-38A5-4D59-85F4-AE618AE31A96}" srcOrd="1" destOrd="0" presId="urn:microsoft.com/office/officeart/2005/8/layout/vList4"/>
+    <dgm:cxn modelId="{7AAFAA15-A3B7-42E5-95A3-9CFF1D91558F}" srcId="{52B2AE58-D871-42D6-B823-3B14A7F7CCE4}" destId="{3E243F17-71E7-47BB-A8A8-F9166F56ED12}" srcOrd="0" destOrd="0" parTransId="{8720515B-8255-497A-9610-DF8BF844EFCF}" sibTransId="{B3B725E8-73B8-4A88-AD87-F43CC970F07D}"/>
     <dgm:cxn modelId="{28E21F1A-4AF3-4E95-B395-3F15998F8659}" type="presOf" srcId="{0370D8F3-42D1-4F25-8EFD-7D695F249778}" destId="{F68F1807-3E6D-427F-AB07-12C2D29194B0}" srcOrd="0" destOrd="1" presId="urn:microsoft.com/office/officeart/2005/8/layout/vList4"/>
     <dgm:cxn modelId="{509F40FB-0910-43A7-ADFC-18E827D0D00D}" type="presOf" srcId="{7A246AA4-0D4A-4D09-86E4-9E256DD80448}" destId="{F68F1807-3E6D-427F-AB07-12C2D29194B0}" srcOrd="0" destOrd="2" presId="urn:microsoft.com/office/officeart/2005/8/layout/vList4"/>
     <dgm:cxn modelId="{6367ED32-1EB1-47EE-BF9B-23F4E229BC42}" type="presOf" srcId="{FA3ABC59-A4CC-4820-A675-5981FA8F1194}" destId="{5C4E1CFD-A5E5-466A-B4D1-BFA0B1F10B1D}" srcOrd="0" destOrd="2" presId="urn:microsoft.com/office/officeart/2005/8/layout/vList4"/>
@@ -2999,6 +3062,13 @@
         </dgm:presLayoutVars>
       </dgm:prSet>
       <dgm:spPr/>
+      <dgm:t>
+        <a:bodyPr/>
+        <a:lstStyle/>
+        <a:p>
+          <a:endParaRPr lang="en-US"/>
+        </a:p>
+      </dgm:t>
     </dgm:pt>
     <dgm:pt modelId="{E5EAEAA0-6567-4D36-8753-2A86E69D1007}" type="pres">
       <dgm:prSet presAssocID="{8D8E05BE-EE0E-4281-9EF7-D9E8AC9C5232}" presName="compNode" presStyleCnt="0"/>
@@ -3015,10 +3085,24 @@
         </dgm:presLayoutVars>
       </dgm:prSet>
       <dgm:spPr/>
+      <dgm:t>
+        <a:bodyPr/>
+        <a:lstStyle/>
+        <a:p>
+          <a:endParaRPr lang="en-US"/>
+        </a:p>
+      </dgm:t>
     </dgm:pt>
     <dgm:pt modelId="{384F460B-5177-4275-AD56-AB0DD7758053}" type="pres">
       <dgm:prSet presAssocID="{9AB9CD5D-507F-4863-8C5B-9BA802D399D0}" presName="sibTrans" presStyleLbl="bgSibTrans2D1" presStyleIdx="0" presStyleCnt="8"/>
       <dgm:spPr/>
+      <dgm:t>
+        <a:bodyPr/>
+        <a:lstStyle/>
+        <a:p>
+          <a:endParaRPr lang="en-US"/>
+        </a:p>
+      </dgm:t>
     </dgm:pt>
     <dgm:pt modelId="{D43A9C58-F1C5-4F51-A9A7-600C975AB156}" type="pres">
       <dgm:prSet presAssocID="{269EEC67-4A9E-438A-B80A-4074E896C89E}" presName="compNode" presStyleCnt="0"/>
@@ -3035,10 +3119,24 @@
         </dgm:presLayoutVars>
       </dgm:prSet>
       <dgm:spPr/>
+      <dgm:t>
+        <a:bodyPr/>
+        <a:lstStyle/>
+        <a:p>
+          <a:endParaRPr lang="en-US"/>
+        </a:p>
+      </dgm:t>
     </dgm:pt>
     <dgm:pt modelId="{944B7389-077B-4B5F-A539-C0C88016D268}" type="pres">
       <dgm:prSet presAssocID="{FE4BE083-EF55-4F9B-B28B-FE9A87623212}" presName="sibTrans" presStyleLbl="bgSibTrans2D1" presStyleIdx="1" presStyleCnt="8"/>
       <dgm:spPr/>
+      <dgm:t>
+        <a:bodyPr/>
+        <a:lstStyle/>
+        <a:p>
+          <a:endParaRPr lang="en-US"/>
+        </a:p>
+      </dgm:t>
     </dgm:pt>
     <dgm:pt modelId="{B7F3796C-8EB9-4197-BA31-D21E8B02515E}" type="pres">
       <dgm:prSet presAssocID="{8D24E70D-6B5F-4701-BE3F-98F1ABA3C4F0}" presName="compNode" presStyleCnt="0"/>
@@ -3055,10 +3153,24 @@
         </dgm:presLayoutVars>
       </dgm:prSet>
       <dgm:spPr/>
+      <dgm:t>
+        <a:bodyPr/>
+        <a:lstStyle/>
+        <a:p>
+          <a:endParaRPr lang="en-US"/>
+        </a:p>
+      </dgm:t>
     </dgm:pt>
     <dgm:pt modelId="{A301BA42-45E7-4DA9-A761-20671693385D}" type="pres">
       <dgm:prSet presAssocID="{2CD54D22-E543-4962-8EEF-598110463664}" presName="sibTrans" presStyleLbl="bgSibTrans2D1" presStyleIdx="2" presStyleCnt="8"/>
       <dgm:spPr/>
+      <dgm:t>
+        <a:bodyPr/>
+        <a:lstStyle/>
+        <a:p>
+          <a:endParaRPr lang="en-US"/>
+        </a:p>
+      </dgm:t>
     </dgm:pt>
     <dgm:pt modelId="{42560CB4-CA59-49A2-9394-72889868B76F}" type="pres">
       <dgm:prSet presAssocID="{7210EF56-24FA-411E-B0A5-EF543F8AB8A8}" presName="compNode" presStyleCnt="0"/>
@@ -3075,10 +3187,24 @@
         </dgm:presLayoutVars>
       </dgm:prSet>
       <dgm:spPr/>
+      <dgm:t>
+        <a:bodyPr/>
+        <a:lstStyle/>
+        <a:p>
+          <a:endParaRPr lang="en-US"/>
+        </a:p>
+      </dgm:t>
     </dgm:pt>
     <dgm:pt modelId="{7BC46AC1-9BB8-4100-B6B1-59FA97F34427}" type="pres">
       <dgm:prSet presAssocID="{ADC8223A-9CDD-419B-B352-1C2BC0D141A2}" presName="sibTrans" presStyleLbl="bgSibTrans2D1" presStyleIdx="3" presStyleCnt="8"/>
       <dgm:spPr/>
+      <dgm:t>
+        <a:bodyPr/>
+        <a:lstStyle/>
+        <a:p>
+          <a:endParaRPr lang="en-US"/>
+        </a:p>
+      </dgm:t>
     </dgm:pt>
     <dgm:pt modelId="{2279C164-20D5-4104-AC94-01AE47EC646D}" type="pres">
       <dgm:prSet presAssocID="{27C73C65-954B-4F3A-A144-51C83BD73115}" presName="compNode" presStyleCnt="0"/>
@@ -3095,10 +3221,24 @@
         </dgm:presLayoutVars>
       </dgm:prSet>
       <dgm:spPr/>
+      <dgm:t>
+        <a:bodyPr/>
+        <a:lstStyle/>
+        <a:p>
+          <a:endParaRPr lang="en-US"/>
+        </a:p>
+      </dgm:t>
     </dgm:pt>
     <dgm:pt modelId="{47731C7C-8247-4C76-87FE-BE47D33B3690}" type="pres">
       <dgm:prSet presAssocID="{A5E64B75-E8BE-44DD-A063-0147F5C36EA6}" presName="sibTrans" presStyleLbl="bgSibTrans2D1" presStyleIdx="4" presStyleCnt="8"/>
       <dgm:spPr/>
+      <dgm:t>
+        <a:bodyPr/>
+        <a:lstStyle/>
+        <a:p>
+          <a:endParaRPr lang="en-US"/>
+        </a:p>
+      </dgm:t>
     </dgm:pt>
     <dgm:pt modelId="{715285C7-E1E6-4340-B7C9-A935C8FE8E77}" type="pres">
       <dgm:prSet presAssocID="{5E33188C-799F-47B3-A1CB-D32B16365F46}" presName="compNode" presStyleCnt="0"/>
@@ -3115,10 +3255,24 @@
         </dgm:presLayoutVars>
       </dgm:prSet>
       <dgm:spPr/>
+      <dgm:t>
+        <a:bodyPr/>
+        <a:lstStyle/>
+        <a:p>
+          <a:endParaRPr lang="en-US"/>
+        </a:p>
+      </dgm:t>
     </dgm:pt>
     <dgm:pt modelId="{B0E48942-2F58-4EC0-996D-45184D28AF95}" type="pres">
       <dgm:prSet presAssocID="{E0AEA4BB-EBA8-4148-AD44-4F328501998F}" presName="sibTrans" presStyleLbl="bgSibTrans2D1" presStyleIdx="5" presStyleCnt="8"/>
       <dgm:spPr/>
+      <dgm:t>
+        <a:bodyPr/>
+        <a:lstStyle/>
+        <a:p>
+          <a:endParaRPr lang="en-US"/>
+        </a:p>
+      </dgm:t>
     </dgm:pt>
     <dgm:pt modelId="{D9E84DFA-25BA-413F-B183-C59D26947B1E}" type="pres">
       <dgm:prSet presAssocID="{D4F93E9B-5B1B-4FF5-AD3B-AE5C23CE5429}" presName="compNode" presStyleCnt="0"/>
@@ -3135,10 +3289,24 @@
         </dgm:presLayoutVars>
       </dgm:prSet>
       <dgm:spPr/>
+      <dgm:t>
+        <a:bodyPr/>
+        <a:lstStyle/>
+        <a:p>
+          <a:endParaRPr lang="en-US"/>
+        </a:p>
+      </dgm:t>
     </dgm:pt>
     <dgm:pt modelId="{FF6F6AC5-4C5D-437D-9687-48853F8E1E32}" type="pres">
       <dgm:prSet presAssocID="{57402CD2-CC65-425C-865C-0E36E3117A16}" presName="sibTrans" presStyleLbl="bgSibTrans2D1" presStyleIdx="6" presStyleCnt="8"/>
       <dgm:spPr/>
+      <dgm:t>
+        <a:bodyPr/>
+        <a:lstStyle/>
+        <a:p>
+          <a:endParaRPr lang="en-US"/>
+        </a:p>
+      </dgm:t>
     </dgm:pt>
     <dgm:pt modelId="{6A825910-F2F5-4FD3-B498-709E9DA611A9}" type="pres">
       <dgm:prSet presAssocID="{0F1A7C93-0CC8-4448-9861-521DE6507655}" presName="compNode" presStyleCnt="0"/>
@@ -3155,10 +3323,24 @@
         </dgm:presLayoutVars>
       </dgm:prSet>
       <dgm:spPr/>
+      <dgm:t>
+        <a:bodyPr/>
+        <a:lstStyle/>
+        <a:p>
+          <a:endParaRPr lang="en-US"/>
+        </a:p>
+      </dgm:t>
     </dgm:pt>
     <dgm:pt modelId="{430D68B8-B493-4135-9D57-58D3302B3AF7}" type="pres">
       <dgm:prSet presAssocID="{93141D69-5ACC-4294-A8C5-08C2155CF618}" presName="sibTrans" presStyleLbl="bgSibTrans2D1" presStyleIdx="7" presStyleCnt="8"/>
       <dgm:spPr/>
+      <dgm:t>
+        <a:bodyPr/>
+        <a:lstStyle/>
+        <a:p>
+          <a:endParaRPr lang="en-US"/>
+        </a:p>
+      </dgm:t>
     </dgm:pt>
     <dgm:pt modelId="{405F875C-8B95-4C48-836D-2BC378AD5EAD}" type="pres">
       <dgm:prSet presAssocID="{CC0094C5-80CC-4E5E-8527-9B75ABD6778C}" presName="compNode" presStyleCnt="0"/>
@@ -3175,36 +3357,43 @@
         </dgm:presLayoutVars>
       </dgm:prSet>
       <dgm:spPr/>
+      <dgm:t>
+        <a:bodyPr/>
+        <a:lstStyle/>
+        <a:p>
+          <a:endParaRPr lang="en-US"/>
+        </a:p>
+      </dgm:t>
     </dgm:pt>
   </dgm:ptLst>
   <dgm:cxnLst>
+    <dgm:cxn modelId="{8F42582E-D9BA-48BB-860B-324C92BC0C3C}" type="presOf" srcId="{5E33188C-799F-47B3-A1CB-D32B16365F46}" destId="{EC8FE878-31C9-4009-9DB5-F5997DB52B6A}" srcOrd="0" destOrd="0" presId="urn:microsoft.com/office/officeart/2005/8/layout/bProcess4"/>
+    <dgm:cxn modelId="{0B5112C5-DB78-4F98-A8A6-9282B2A5BFA3}" type="presOf" srcId="{8D24E70D-6B5F-4701-BE3F-98F1ABA3C4F0}" destId="{74613DA0-B015-4C29-B01B-4ECC74B8D2DE}" srcOrd="0" destOrd="0" presId="urn:microsoft.com/office/officeart/2005/8/layout/bProcess4"/>
+    <dgm:cxn modelId="{1CD16044-80C8-41E6-AB0D-5962DB4B2499}" type="presOf" srcId="{FE4BE083-EF55-4F9B-B28B-FE9A87623212}" destId="{944B7389-077B-4B5F-A539-C0C88016D268}" srcOrd="0" destOrd="0" presId="urn:microsoft.com/office/officeart/2005/8/layout/bProcess4"/>
+    <dgm:cxn modelId="{94297ACD-630C-44CC-B61D-05A1D60A68F5}" srcId="{7299BC7B-18BE-4051-A577-BCA7361E8B7B}" destId="{7210EF56-24FA-411E-B0A5-EF543F8AB8A8}" srcOrd="3" destOrd="0" parTransId="{E10530C3-C785-4126-9602-B328D60F7A24}" sibTransId="{ADC8223A-9CDD-419B-B352-1C2BC0D141A2}"/>
+    <dgm:cxn modelId="{AABC8874-9ADB-42F9-89ED-55FFEA0B5364}" type="presOf" srcId="{0F1A7C93-0CC8-4448-9861-521DE6507655}" destId="{DC253504-5BB3-4BE6-80CE-C61D6EFB3DA0}" srcOrd="0" destOrd="0" presId="urn:microsoft.com/office/officeart/2005/8/layout/bProcess4"/>
+    <dgm:cxn modelId="{8AF9E220-A6E5-4277-80D7-6C18CF750E7E}" srcId="{7299BC7B-18BE-4051-A577-BCA7361E8B7B}" destId="{8D8E05BE-EE0E-4281-9EF7-D9E8AC9C5232}" srcOrd="0" destOrd="0" parTransId="{16910045-AD7B-4A8A-8A19-AC6CAB33991C}" sibTransId="{9AB9CD5D-507F-4863-8C5B-9BA802D399D0}"/>
+    <dgm:cxn modelId="{F0B5A00C-DE8A-4545-A337-93543B7F4B7F}" srcId="{7299BC7B-18BE-4051-A577-BCA7361E8B7B}" destId="{269EEC67-4A9E-438A-B80A-4074E896C89E}" srcOrd="1" destOrd="0" parTransId="{F4C47D99-D969-44FE-93DA-37EED90E561F}" sibTransId="{FE4BE083-EF55-4F9B-B28B-FE9A87623212}"/>
+    <dgm:cxn modelId="{60034599-4559-40E4-88E2-8F51C605B117}" type="presOf" srcId="{9AB9CD5D-507F-4863-8C5B-9BA802D399D0}" destId="{384F460B-5177-4275-AD56-AB0DD7758053}" srcOrd="0" destOrd="0" presId="urn:microsoft.com/office/officeart/2005/8/layout/bProcess4"/>
+    <dgm:cxn modelId="{45133C62-F0D6-4340-9702-2EFC9D34F8A9}" type="presOf" srcId="{57402CD2-CC65-425C-865C-0E36E3117A16}" destId="{FF6F6AC5-4C5D-437D-9687-48853F8E1E32}" srcOrd="0" destOrd="0" presId="urn:microsoft.com/office/officeart/2005/8/layout/bProcess4"/>
+    <dgm:cxn modelId="{C2C171C9-69F2-4E7C-86CE-D3244C84B64E}" type="presOf" srcId="{93141D69-5ACC-4294-A8C5-08C2155CF618}" destId="{430D68B8-B493-4135-9D57-58D3302B3AF7}" srcOrd="0" destOrd="0" presId="urn:microsoft.com/office/officeart/2005/8/layout/bProcess4"/>
+    <dgm:cxn modelId="{D99FED10-8407-4C2D-BDBD-23D41B5F3449}" type="presOf" srcId="{E0AEA4BB-EBA8-4148-AD44-4F328501998F}" destId="{B0E48942-2F58-4EC0-996D-45184D28AF95}" srcOrd="0" destOrd="0" presId="urn:microsoft.com/office/officeart/2005/8/layout/bProcess4"/>
+    <dgm:cxn modelId="{4C781258-DEC9-4B4F-8C60-6F782B9B0AD7}" type="presOf" srcId="{ADC8223A-9CDD-419B-B352-1C2BC0D141A2}" destId="{7BC46AC1-9BB8-4100-B6B1-59FA97F34427}" srcOrd="0" destOrd="0" presId="urn:microsoft.com/office/officeart/2005/8/layout/bProcess4"/>
+    <dgm:cxn modelId="{05AD52EA-9D71-489C-A439-27EBF2B9280D}" srcId="{7299BC7B-18BE-4051-A577-BCA7361E8B7B}" destId="{5E33188C-799F-47B3-A1CB-D32B16365F46}" srcOrd="5" destOrd="0" parTransId="{D0EFE4DC-21FB-4959-ABBD-4E0AF3CE27DB}" sibTransId="{E0AEA4BB-EBA8-4148-AD44-4F328501998F}"/>
+    <dgm:cxn modelId="{63A298F5-31BD-43BC-A82D-41170E75E72B}" srcId="{7299BC7B-18BE-4051-A577-BCA7361E8B7B}" destId="{D4F93E9B-5B1B-4FF5-AD3B-AE5C23CE5429}" srcOrd="6" destOrd="0" parTransId="{A0C5BEAB-6A0F-4879-A35D-443C2BD18394}" sibTransId="{57402CD2-CC65-425C-865C-0E36E3117A16}"/>
+    <dgm:cxn modelId="{B3690D5E-380D-4368-9740-1D82040936B1}" type="presOf" srcId="{27C73C65-954B-4F3A-A144-51C83BD73115}" destId="{D90A8315-E301-4BC9-AA3E-FD9E2481117A}" srcOrd="0" destOrd="0" presId="urn:microsoft.com/office/officeart/2005/8/layout/bProcess4"/>
+    <dgm:cxn modelId="{4A2A4B31-16D2-4B77-86DB-F62C3D9F4829}" srcId="{7299BC7B-18BE-4051-A577-BCA7361E8B7B}" destId="{8D24E70D-6B5F-4701-BE3F-98F1ABA3C4F0}" srcOrd="2" destOrd="0" parTransId="{12445164-0D05-4A12-882C-BED7B1DC2BCC}" sibTransId="{2CD54D22-E543-4962-8EEF-598110463664}"/>
+    <dgm:cxn modelId="{3A745D1A-DB1D-4531-9BD8-410DE640033B}" type="presOf" srcId="{8D8E05BE-EE0E-4281-9EF7-D9E8AC9C5232}" destId="{2613849C-795A-447B-A898-AFC5425454BE}" srcOrd="0" destOrd="0" presId="urn:microsoft.com/office/officeart/2005/8/layout/bProcess4"/>
+    <dgm:cxn modelId="{CC990B94-FA01-489C-AD16-01161F48D458}" type="presOf" srcId="{D4F93E9B-5B1B-4FF5-AD3B-AE5C23CE5429}" destId="{986CBD7F-9B2E-44A7-AA37-EB71E8A5292E}" srcOrd="0" destOrd="0" presId="urn:microsoft.com/office/officeart/2005/8/layout/bProcess4"/>
+    <dgm:cxn modelId="{D4B471C2-20AB-401E-9268-E41C99D6EB7E}" srcId="{7299BC7B-18BE-4051-A577-BCA7361E8B7B}" destId="{CC0094C5-80CC-4E5E-8527-9B75ABD6778C}" srcOrd="8" destOrd="0" parTransId="{0F41E874-402C-4A70-B696-8974DECCE2EB}" sibTransId="{DD268313-FB1B-4016-BEB5-291F9554431C}"/>
+    <dgm:cxn modelId="{9FD33BC3-1F55-41EB-8786-C889D108A931}" srcId="{7299BC7B-18BE-4051-A577-BCA7361E8B7B}" destId="{0F1A7C93-0CC8-4448-9861-521DE6507655}" srcOrd="7" destOrd="0" parTransId="{2586E4E1-BC95-409D-B561-EB40172A5A70}" sibTransId="{93141D69-5ACC-4294-A8C5-08C2155CF618}"/>
     <dgm:cxn modelId="{D316F445-74F5-4D36-8CBC-8C1D38724F4E}" type="presOf" srcId="{A5E64B75-E8BE-44DD-A063-0147F5C36EA6}" destId="{47731C7C-8247-4C76-87FE-BE47D33B3690}" srcOrd="0" destOrd="0" presId="urn:microsoft.com/office/officeart/2005/8/layout/bProcess4"/>
-    <dgm:cxn modelId="{0B5112C5-DB78-4F98-A8A6-9282B2A5BFA3}" type="presOf" srcId="{8D24E70D-6B5F-4701-BE3F-98F1ABA3C4F0}" destId="{74613DA0-B015-4C29-B01B-4ECC74B8D2DE}" srcOrd="0" destOrd="0" presId="urn:microsoft.com/office/officeart/2005/8/layout/bProcess4"/>
-    <dgm:cxn modelId="{63A298F5-31BD-43BC-A82D-41170E75E72B}" srcId="{7299BC7B-18BE-4051-A577-BCA7361E8B7B}" destId="{D4F93E9B-5B1B-4FF5-AD3B-AE5C23CE5429}" srcOrd="6" destOrd="0" parTransId="{A0C5BEAB-6A0F-4879-A35D-443C2BD18394}" sibTransId="{57402CD2-CC65-425C-865C-0E36E3117A16}"/>
-    <dgm:cxn modelId="{9FD33BC3-1F55-41EB-8786-C889D108A931}" srcId="{7299BC7B-18BE-4051-A577-BCA7361E8B7B}" destId="{0F1A7C93-0CC8-4448-9861-521DE6507655}" srcOrd="7" destOrd="0" parTransId="{2586E4E1-BC95-409D-B561-EB40172A5A70}" sibTransId="{93141D69-5ACC-4294-A8C5-08C2155CF618}"/>
-    <dgm:cxn modelId="{4C781258-DEC9-4B4F-8C60-6F782B9B0AD7}" type="presOf" srcId="{ADC8223A-9CDD-419B-B352-1C2BC0D141A2}" destId="{7BC46AC1-9BB8-4100-B6B1-59FA97F34427}" srcOrd="0" destOrd="0" presId="urn:microsoft.com/office/officeart/2005/8/layout/bProcess4"/>
-    <dgm:cxn modelId="{4A2A4B31-16D2-4B77-86DB-F62C3D9F4829}" srcId="{7299BC7B-18BE-4051-A577-BCA7361E8B7B}" destId="{8D24E70D-6B5F-4701-BE3F-98F1ABA3C4F0}" srcOrd="2" destOrd="0" parTransId="{12445164-0D05-4A12-882C-BED7B1DC2BCC}" sibTransId="{2CD54D22-E543-4962-8EEF-598110463664}"/>
-    <dgm:cxn modelId="{05AD52EA-9D71-489C-A439-27EBF2B9280D}" srcId="{7299BC7B-18BE-4051-A577-BCA7361E8B7B}" destId="{5E33188C-799F-47B3-A1CB-D32B16365F46}" srcOrd="5" destOrd="0" parTransId="{D0EFE4DC-21FB-4959-ABBD-4E0AF3CE27DB}" sibTransId="{E0AEA4BB-EBA8-4148-AD44-4F328501998F}"/>
-    <dgm:cxn modelId="{94297ACD-630C-44CC-B61D-05A1D60A68F5}" srcId="{7299BC7B-18BE-4051-A577-BCA7361E8B7B}" destId="{7210EF56-24FA-411E-B0A5-EF543F8AB8A8}" srcOrd="3" destOrd="0" parTransId="{E10530C3-C785-4126-9602-B328D60F7A24}" sibTransId="{ADC8223A-9CDD-419B-B352-1C2BC0D141A2}"/>
+    <dgm:cxn modelId="{24F62E97-F214-4BBC-9197-D80706441882}" type="presOf" srcId="{269EEC67-4A9E-438A-B80A-4074E896C89E}" destId="{33ECD54F-0FBD-44CA-A48B-5082278EF485}" srcOrd="0" destOrd="0" presId="urn:microsoft.com/office/officeart/2005/8/layout/bProcess4"/>
     <dgm:cxn modelId="{36E2AFC5-4CBE-4B9B-BA87-8C3D327E45DE}" type="presOf" srcId="{7299BC7B-18BE-4051-A577-BCA7361E8B7B}" destId="{44AEA8B2-4776-427B-AFAA-FF81B11275B8}" srcOrd="0" destOrd="0" presId="urn:microsoft.com/office/officeart/2005/8/layout/bProcess4"/>
+    <dgm:cxn modelId="{7B1941D6-7AF8-423B-BCD2-A2CD81C4C0F3}" srcId="{7299BC7B-18BE-4051-A577-BCA7361E8B7B}" destId="{27C73C65-954B-4F3A-A144-51C83BD73115}" srcOrd="4" destOrd="0" parTransId="{FEE9CC67-E3BD-44E2-9503-A01A60C889D9}" sibTransId="{A5E64B75-E8BE-44DD-A063-0147F5C36EA6}"/>
+    <dgm:cxn modelId="{F35DFDA4-03D1-4A57-8168-EC83F16371CA}" type="presOf" srcId="{CC0094C5-80CC-4E5E-8527-9B75ABD6778C}" destId="{571C9AEC-32B9-4209-BA07-62EEB044A8D2}" srcOrd="0" destOrd="0" presId="urn:microsoft.com/office/officeart/2005/8/layout/bProcess4"/>
+    <dgm:cxn modelId="{244EC613-4F50-46AE-A044-784081EA1422}" type="presOf" srcId="{2CD54D22-E543-4962-8EEF-598110463664}" destId="{A301BA42-45E7-4DA9-A761-20671693385D}" srcOrd="0" destOrd="0" presId="urn:microsoft.com/office/officeart/2005/8/layout/bProcess4"/>
     <dgm:cxn modelId="{92A04692-517F-4BCF-B50B-780F9008EF7A}" type="presOf" srcId="{7210EF56-24FA-411E-B0A5-EF543F8AB8A8}" destId="{6B59A414-B72B-4AB4-B3FA-734EF8758145}" srcOrd="0" destOrd="0" presId="urn:microsoft.com/office/officeart/2005/8/layout/bProcess4"/>
-    <dgm:cxn modelId="{60034599-4559-40E4-88E2-8F51C605B117}" type="presOf" srcId="{9AB9CD5D-507F-4863-8C5B-9BA802D399D0}" destId="{384F460B-5177-4275-AD56-AB0DD7758053}" srcOrd="0" destOrd="0" presId="urn:microsoft.com/office/officeart/2005/8/layout/bProcess4"/>
-    <dgm:cxn modelId="{8F42582E-D9BA-48BB-860B-324C92BC0C3C}" type="presOf" srcId="{5E33188C-799F-47B3-A1CB-D32B16365F46}" destId="{EC8FE878-31C9-4009-9DB5-F5997DB52B6A}" srcOrd="0" destOrd="0" presId="urn:microsoft.com/office/officeart/2005/8/layout/bProcess4"/>
-    <dgm:cxn modelId="{8AF9E220-A6E5-4277-80D7-6C18CF750E7E}" srcId="{7299BC7B-18BE-4051-A577-BCA7361E8B7B}" destId="{8D8E05BE-EE0E-4281-9EF7-D9E8AC9C5232}" srcOrd="0" destOrd="0" parTransId="{16910045-AD7B-4A8A-8A19-AC6CAB33991C}" sibTransId="{9AB9CD5D-507F-4863-8C5B-9BA802D399D0}"/>
-    <dgm:cxn modelId="{D99FED10-8407-4C2D-BDBD-23D41B5F3449}" type="presOf" srcId="{E0AEA4BB-EBA8-4148-AD44-4F328501998F}" destId="{B0E48942-2F58-4EC0-996D-45184D28AF95}" srcOrd="0" destOrd="0" presId="urn:microsoft.com/office/officeart/2005/8/layout/bProcess4"/>
-    <dgm:cxn modelId="{F0B5A00C-DE8A-4545-A337-93543B7F4B7F}" srcId="{7299BC7B-18BE-4051-A577-BCA7361E8B7B}" destId="{269EEC67-4A9E-438A-B80A-4074E896C89E}" srcOrd="1" destOrd="0" parTransId="{F4C47D99-D969-44FE-93DA-37EED90E561F}" sibTransId="{FE4BE083-EF55-4F9B-B28B-FE9A87623212}"/>
-    <dgm:cxn modelId="{24F62E97-F214-4BBC-9197-D80706441882}" type="presOf" srcId="{269EEC67-4A9E-438A-B80A-4074E896C89E}" destId="{33ECD54F-0FBD-44CA-A48B-5082278EF485}" srcOrd="0" destOrd="0" presId="urn:microsoft.com/office/officeart/2005/8/layout/bProcess4"/>
-    <dgm:cxn modelId="{1CD16044-80C8-41E6-AB0D-5962DB4B2499}" type="presOf" srcId="{FE4BE083-EF55-4F9B-B28B-FE9A87623212}" destId="{944B7389-077B-4B5F-A539-C0C88016D268}" srcOrd="0" destOrd="0" presId="urn:microsoft.com/office/officeart/2005/8/layout/bProcess4"/>
-    <dgm:cxn modelId="{AABC8874-9ADB-42F9-89ED-55FFEA0B5364}" type="presOf" srcId="{0F1A7C93-0CC8-4448-9861-521DE6507655}" destId="{DC253504-5BB3-4BE6-80CE-C61D6EFB3DA0}" srcOrd="0" destOrd="0" presId="urn:microsoft.com/office/officeart/2005/8/layout/bProcess4"/>
-    <dgm:cxn modelId="{B3690D5E-380D-4368-9740-1D82040936B1}" type="presOf" srcId="{27C73C65-954B-4F3A-A144-51C83BD73115}" destId="{D90A8315-E301-4BC9-AA3E-FD9E2481117A}" srcOrd="0" destOrd="0" presId="urn:microsoft.com/office/officeart/2005/8/layout/bProcess4"/>
-    <dgm:cxn modelId="{CC990B94-FA01-489C-AD16-01161F48D458}" type="presOf" srcId="{D4F93E9B-5B1B-4FF5-AD3B-AE5C23CE5429}" destId="{986CBD7F-9B2E-44A7-AA37-EB71E8A5292E}" srcOrd="0" destOrd="0" presId="urn:microsoft.com/office/officeart/2005/8/layout/bProcess4"/>
-    <dgm:cxn modelId="{45133C62-F0D6-4340-9702-2EFC9D34F8A9}" type="presOf" srcId="{57402CD2-CC65-425C-865C-0E36E3117A16}" destId="{FF6F6AC5-4C5D-437D-9687-48853F8E1E32}" srcOrd="0" destOrd="0" presId="urn:microsoft.com/office/officeart/2005/8/layout/bProcess4"/>
-    <dgm:cxn modelId="{244EC613-4F50-46AE-A044-784081EA1422}" type="presOf" srcId="{2CD54D22-E543-4962-8EEF-598110463664}" destId="{A301BA42-45E7-4DA9-A761-20671693385D}" srcOrd="0" destOrd="0" presId="urn:microsoft.com/office/officeart/2005/8/layout/bProcess4"/>
-    <dgm:cxn modelId="{C2C171C9-69F2-4E7C-86CE-D3244C84B64E}" type="presOf" srcId="{93141D69-5ACC-4294-A8C5-08C2155CF618}" destId="{430D68B8-B493-4135-9D57-58D3302B3AF7}" srcOrd="0" destOrd="0" presId="urn:microsoft.com/office/officeart/2005/8/layout/bProcess4"/>
-    <dgm:cxn modelId="{7B1941D6-7AF8-423B-BCD2-A2CD81C4C0F3}" srcId="{7299BC7B-18BE-4051-A577-BCA7361E8B7B}" destId="{27C73C65-954B-4F3A-A144-51C83BD73115}" srcOrd="4" destOrd="0" parTransId="{FEE9CC67-E3BD-44E2-9503-A01A60C889D9}" sibTransId="{A5E64B75-E8BE-44DD-A063-0147F5C36EA6}"/>
-    <dgm:cxn modelId="{D4B471C2-20AB-401E-9268-E41C99D6EB7E}" srcId="{7299BC7B-18BE-4051-A577-BCA7361E8B7B}" destId="{CC0094C5-80CC-4E5E-8527-9B75ABD6778C}" srcOrd="8" destOrd="0" parTransId="{0F41E874-402C-4A70-B696-8974DECCE2EB}" sibTransId="{DD268313-FB1B-4016-BEB5-291F9554431C}"/>
-    <dgm:cxn modelId="{3A745D1A-DB1D-4531-9BD8-410DE640033B}" type="presOf" srcId="{8D8E05BE-EE0E-4281-9EF7-D9E8AC9C5232}" destId="{2613849C-795A-447B-A898-AFC5425454BE}" srcOrd="0" destOrd="0" presId="urn:microsoft.com/office/officeart/2005/8/layout/bProcess4"/>
-    <dgm:cxn modelId="{F35DFDA4-03D1-4A57-8168-EC83F16371CA}" type="presOf" srcId="{CC0094C5-80CC-4E5E-8527-9B75ABD6778C}" destId="{571C9AEC-32B9-4209-BA07-62EEB044A8D2}" srcOrd="0" destOrd="0" presId="urn:microsoft.com/office/officeart/2005/8/layout/bProcess4"/>
     <dgm:cxn modelId="{88F5D935-342D-4321-A698-373EE2FE3EB6}" type="presParOf" srcId="{44AEA8B2-4776-427B-AFAA-FF81B11275B8}" destId="{E5EAEAA0-6567-4D36-8753-2A86E69D1007}" srcOrd="0" destOrd="0" presId="urn:microsoft.com/office/officeart/2005/8/layout/bProcess4"/>
     <dgm:cxn modelId="{A1C57692-BA5D-43AD-9F52-6106ED183318}" type="presParOf" srcId="{E5EAEAA0-6567-4D36-8753-2A86E69D1007}" destId="{C41F16DC-06D6-4957-8486-1FE571AA66A0}" srcOrd="0" destOrd="0" presId="urn:microsoft.com/office/officeart/2005/8/layout/bProcess4"/>
     <dgm:cxn modelId="{C1CCC5E0-53EF-432D-9376-104C3897D19C}" type="presParOf" srcId="{E5EAEAA0-6567-4D36-8753-2A86E69D1007}" destId="{2613849C-795A-447B-A898-AFC5425454BE}" srcOrd="1" destOrd="0" presId="urn:microsoft.com/office/officeart/2005/8/layout/bProcess4"/>
@@ -3305,7 +3494,7 @@
         </a:bodyPr>
         <a:lstStyle/>
         <a:p>
-          <a:pPr marL="0" lvl="0" indent="0" algn="l" defTabSz="2222500">
+          <a:pPr lvl="0" algn="l" defTabSz="2222500">
             <a:lnSpc>
               <a:spcPct val="90000"/>
             </a:lnSpc>
@@ -3315,7 +3504,6 @@
             <a:spcAft>
               <a:spcPct val="35000"/>
             </a:spcAft>
-            <a:buNone/>
           </a:pPr>
           <a:r>
             <a:rPr lang="en-US" sz="5000" kern="1200" dirty="0"/>
@@ -3333,7 +3521,7 @@
             <a:spcAft>
               <a:spcPct val="15000"/>
             </a:spcAft>
-            <a:buChar char="•"/>
+            <a:buChar char="••"/>
           </a:pPr>
           <a:r>
             <a:rPr lang="en-US" sz="3900" kern="1200" dirty="0"/>
@@ -3446,7 +3634,7 @@
         </a:bodyPr>
         <a:lstStyle/>
         <a:p>
-          <a:pPr marL="0" lvl="0" indent="0" algn="l" defTabSz="2222500">
+          <a:pPr lvl="0" algn="l" defTabSz="2222500">
             <a:lnSpc>
               <a:spcPct val="90000"/>
             </a:lnSpc>
@@ -3456,11 +3644,10 @@
             <a:spcAft>
               <a:spcPct val="35000"/>
             </a:spcAft>
-            <a:buNone/>
           </a:pPr>
           <a:r>
-            <a:rPr lang="en-US" sz="5000" kern="1200" dirty="0" err="1"/>
-            <a:t>IntelXDK</a:t>
+            <a:rPr lang="en-US" sz="5000" kern="1200" dirty="0" smtClean="0"/>
+            <a:t>Intel XDK</a:t>
           </a:r>
           <a:endParaRPr lang="en-US" sz="5000" kern="1200" dirty="0"/>
         </a:p>
@@ -3475,7 +3662,7 @@
             <a:spcAft>
               <a:spcPct val="15000"/>
             </a:spcAft>
-            <a:buChar char="•"/>
+            <a:buChar char="••"/>
           </a:pPr>
           <a:r>
             <a:rPr lang="en-US" sz="3900" kern="1200" dirty="0"/>
@@ -3493,7 +3680,7 @@
             <a:spcAft>
               <a:spcPct val="15000"/>
             </a:spcAft>
-            <a:buChar char="•"/>
+            <a:buChar char="••"/>
           </a:pPr>
           <a:r>
             <a:rPr lang="en-US" sz="3900" kern="1200" dirty="0"/>
@@ -3606,7 +3793,7 @@
         </a:bodyPr>
         <a:lstStyle/>
         <a:p>
-          <a:pPr marL="0" lvl="0" indent="0" algn="l" defTabSz="2222500">
+          <a:pPr lvl="0" algn="l" defTabSz="2222500">
             <a:lnSpc>
               <a:spcPct val="90000"/>
             </a:lnSpc>
@@ -3616,7 +3803,6 @@
             <a:spcAft>
               <a:spcPct val="35000"/>
             </a:spcAft>
-            <a:buNone/>
           </a:pPr>
           <a:r>
             <a:rPr lang="en-US" sz="5000" kern="1200" dirty="0" err="1"/>
@@ -3635,7 +3821,7 @@
             <a:spcAft>
               <a:spcPct val="15000"/>
             </a:spcAft>
-            <a:buChar char="•"/>
+            <a:buChar char="••"/>
           </a:pPr>
           <a:r>
             <a:rPr lang="en-US" sz="3900" kern="1200" dirty="0"/>
@@ -3653,7 +3839,7 @@
             <a:spcAft>
               <a:spcPct val="15000"/>
             </a:spcAft>
-            <a:buChar char="•"/>
+            <a:buChar char="••"/>
           </a:pPr>
           <a:r>
             <a:rPr lang="en-US" sz="3900" kern="1200" dirty="0"/>
@@ -3671,7 +3857,7 @@
             <a:spcAft>
               <a:spcPct val="15000"/>
             </a:spcAft>
-            <a:buChar char="•"/>
+            <a:buChar char="••"/>
           </a:pPr>
           <a:r>
             <a:rPr lang="en-US" sz="3900" kern="1200" dirty="0"/>
@@ -3784,7 +3970,7 @@
         </a:bodyPr>
         <a:lstStyle/>
         <a:p>
-          <a:pPr marL="0" lvl="0" indent="0" algn="l" defTabSz="2222500">
+          <a:pPr lvl="0" algn="l" defTabSz="2222500">
             <a:lnSpc>
               <a:spcPct val="90000"/>
             </a:lnSpc>
@@ -3794,7 +3980,6 @@
             <a:spcAft>
               <a:spcPct val="35000"/>
             </a:spcAft>
-            <a:buNone/>
           </a:pPr>
           <a:r>
             <a:rPr lang="en-US" sz="5000" kern="1200" dirty="0"/>
@@ -3812,7 +3997,7 @@
             <a:spcAft>
               <a:spcPct val="15000"/>
             </a:spcAft>
-            <a:buChar char="•"/>
+            <a:buChar char="••"/>
           </a:pPr>
           <a:r>
             <a:rPr lang="en-US" sz="3900" kern="1200" dirty="0"/>
@@ -3989,7 +4174,7 @@
         </a:bodyPr>
         <a:lstStyle/>
         <a:p>
-          <a:pPr marL="0" lvl="0" indent="0" algn="ctr" defTabSz="1911350" rtl="0">
+          <a:pPr lvl="0" algn="ctr" defTabSz="1911350" rtl="0">
             <a:lnSpc>
               <a:spcPct val="90000"/>
             </a:lnSpc>
@@ -3999,7 +4184,6 @@
             <a:spcAft>
               <a:spcPct val="35000"/>
             </a:spcAft>
-            <a:buNone/>
           </a:pPr>
           <a:r>
             <a:rPr lang="en-US" sz="4300" kern="1200" dirty="0">
@@ -4116,7 +4300,7 @@
         </a:bodyPr>
         <a:lstStyle/>
         <a:p>
-          <a:pPr marL="0" lvl="0" indent="0" algn="ctr" defTabSz="1911350" rtl="0">
+          <a:pPr lvl="0" algn="ctr" defTabSz="1911350" rtl="0">
             <a:lnSpc>
               <a:spcPct val="90000"/>
             </a:lnSpc>
@@ -4126,7 +4310,6 @@
             <a:spcAft>
               <a:spcPct val="35000"/>
             </a:spcAft>
-            <a:buNone/>
           </a:pPr>
           <a:r>
             <a:rPr lang="en-US" sz="4300" kern="1200" dirty="0">
@@ -4243,7 +4426,7 @@
         </a:bodyPr>
         <a:lstStyle/>
         <a:p>
-          <a:pPr marL="0" lvl="0" indent="0" algn="ctr" defTabSz="1911350" rtl="0">
+          <a:pPr lvl="0" algn="ctr" defTabSz="1911350" rtl="0">
             <a:lnSpc>
               <a:spcPct val="90000"/>
             </a:lnSpc>
@@ -4253,7 +4436,6 @@
             <a:spcAft>
               <a:spcPct val="35000"/>
             </a:spcAft>
-            <a:buNone/>
           </a:pPr>
           <a:r>
             <a:rPr lang="en-US" sz="4300" kern="1200" dirty="0">
@@ -4370,7 +4552,7 @@
         </a:bodyPr>
         <a:lstStyle/>
         <a:p>
-          <a:pPr marL="0" lvl="0" indent="0" algn="ctr" defTabSz="1911350" rtl="0">
+          <a:pPr lvl="0" algn="ctr" defTabSz="1911350" rtl="0">
             <a:lnSpc>
               <a:spcPct val="90000"/>
             </a:lnSpc>
@@ -4380,7 +4562,6 @@
             <a:spcAft>
               <a:spcPct val="35000"/>
             </a:spcAft>
-            <a:buNone/>
           </a:pPr>
           <a:r>
             <a:rPr lang="en-US" sz="4300" kern="1200" dirty="0">
@@ -4497,7 +4678,7 @@
         </a:bodyPr>
         <a:lstStyle/>
         <a:p>
-          <a:pPr marL="0" lvl="0" indent="0" algn="ctr" defTabSz="1911350" rtl="0">
+          <a:pPr lvl="0" algn="ctr" defTabSz="1911350" rtl="0">
             <a:lnSpc>
               <a:spcPct val="90000"/>
             </a:lnSpc>
@@ -4507,7 +4688,6 @@
             <a:spcAft>
               <a:spcPct val="35000"/>
             </a:spcAft>
-            <a:buNone/>
           </a:pPr>
           <a:r>
             <a:rPr lang="en-US" sz="4300" kern="1200" dirty="0">
@@ -4624,7 +4804,7 @@
         </a:bodyPr>
         <a:lstStyle/>
         <a:p>
-          <a:pPr marL="0" lvl="0" indent="0" algn="ctr" defTabSz="1911350" rtl="0">
+          <a:pPr lvl="0" algn="ctr" defTabSz="1911350" rtl="0">
             <a:lnSpc>
               <a:spcPct val="90000"/>
             </a:lnSpc>
@@ -4634,7 +4814,6 @@
             <a:spcAft>
               <a:spcPct val="35000"/>
             </a:spcAft>
-            <a:buNone/>
           </a:pPr>
           <a:r>
             <a:rPr lang="en-US" sz="4300" kern="1200" dirty="0">
@@ -4751,7 +4930,7 @@
         </a:bodyPr>
         <a:lstStyle/>
         <a:p>
-          <a:pPr marL="0" lvl="0" indent="0" algn="ctr" defTabSz="1911350" rtl="0">
+          <a:pPr lvl="0" algn="ctr" defTabSz="1911350" rtl="0">
             <a:lnSpc>
               <a:spcPct val="90000"/>
             </a:lnSpc>
@@ -4761,7 +4940,6 @@
             <a:spcAft>
               <a:spcPct val="35000"/>
             </a:spcAft>
-            <a:buNone/>
           </a:pPr>
           <a:r>
             <a:rPr lang="en-US" sz="4300" kern="1200" dirty="0">
@@ -4878,7 +5056,7 @@
         </a:bodyPr>
         <a:lstStyle/>
         <a:p>
-          <a:pPr marL="0" lvl="0" indent="0" algn="ctr" defTabSz="1911350">
+          <a:pPr lvl="0" algn="ctr" defTabSz="1911350">
             <a:lnSpc>
               <a:spcPct val="90000"/>
             </a:lnSpc>
@@ -4888,7 +5066,6 @@
             <a:spcAft>
               <a:spcPct val="35000"/>
             </a:spcAft>
-            <a:buNone/>
           </a:pPr>
           <a:r>
             <a:rPr lang="en-US" sz="4300" kern="1200" dirty="0"/>
@@ -4957,7 +5134,7 @@
         </a:bodyPr>
         <a:lstStyle/>
         <a:p>
-          <a:pPr marL="0" lvl="0" indent="0" algn="ctr" defTabSz="1911350">
+          <a:pPr lvl="0" algn="ctr" defTabSz="1911350">
             <a:lnSpc>
               <a:spcPct val="90000"/>
             </a:lnSpc>
@@ -4967,7 +5144,6 @@
             <a:spcAft>
               <a:spcPct val="35000"/>
             </a:spcAft>
-            <a:buNone/>
           </a:pPr>
           <a:r>
             <a:rPr lang="en-US" sz="4300" kern="1200" dirty="0"/>
@@ -16963,6 +17139,7 @@
           <a:ln>
             <a:noFill/>
           </a:ln>
+          <a:effectLst/>
         </p:spPr>
         <p:txBody>
           <a:bodyPr lIns="438750" tIns="219375" rIns="438750" bIns="219375" anchor="ctr" anchorCtr="0">
@@ -16984,6 +17161,18 @@
                 <a:sym typeface="Calibri"/>
               </a:rPr>
               <a:t>Game Table &amp; Air Hockey Game</a:t>
+            </a:r>
+            <a:r>
+              <a:rPr lang="en-US" sz="10000" b="0" i="0" u="none" strike="noStrike" cap="none" baseline="0" dirty="0">
+                <a:solidFill>
+                  <a:schemeClr val="dk1"/>
+                </a:solidFill>
+                <a:latin typeface="Calibri"/>
+                <a:ea typeface="Calibri"/>
+                <a:cs typeface="Calibri"/>
+                <a:sym typeface="Calibri"/>
+              </a:rPr>
+              <a:t/>
             </a:r>
             <a:br>
               <a:rPr lang="en-US" sz="10000" b="0" i="0" u="none" strike="noStrike" cap="none" baseline="0" dirty="0">
@@ -17053,7 +17242,13 @@
               <a:rPr lang="en-US" sz="4800" dirty="0">
                 <a:latin typeface="+mj-lt"/>
               </a:rPr>
-              <a:t>Matthew Machado, Frazier, Graham</a:t>
+              <a:t>Matthew Machado, Frazier, </a:t>
+            </a:r>
+            <a:r>
+              <a:rPr lang="en-US" sz="4800" dirty="0" smtClean="0">
+                <a:latin typeface="+mj-lt"/>
+              </a:rPr>
+              <a:t>Graham</a:t>
             </a:r>
             <a:endParaRPr lang="en-US" sz="4800" b="0" i="0" u="none" strike="noStrike" cap="none" baseline="30000" dirty="0">
               <a:solidFill>
@@ -17064,159 +17259,6 @@
               <a:cs typeface="Calibri"/>
               <a:sym typeface="Calibri"/>
             </a:endParaRPr>
-          </a:p>
-          <a:p>
-            <a:pPr marL="0" marR="0" lvl="0" indent="0" algn="ctr" rtl="0">
-              <a:lnSpc>
-                <a:spcPct val="100000"/>
-              </a:lnSpc>
-              <a:spcBef>
-                <a:spcPts val="0"/>
-              </a:spcBef>
-              <a:spcAft>
-                <a:spcPts val="0"/>
-              </a:spcAft>
-              <a:buClr>
-                <a:schemeClr val="dk1"/>
-              </a:buClr>
-              <a:buSzPct val="25000"/>
-              <a:buFont typeface="Calibri"/>
-              <a:buNone/>
-            </a:pPr>
-            <a:r>
-              <a:rPr lang="en-US" sz="2800" b="0" i="0" u="none" strike="noStrike" cap="none" baseline="30000" dirty="0">
-                <a:solidFill>
-                  <a:schemeClr val="dk1"/>
-                </a:solidFill>
-                <a:latin typeface="Calibri"/>
-                <a:ea typeface="Calibri"/>
-                <a:cs typeface="Calibri"/>
-                <a:sym typeface="Calibri"/>
-              </a:rPr>
-              <a:t>1</a:t>
-            </a:r>
-            <a:r>
-              <a:rPr lang="en-US" sz="2800" dirty="0">
-                <a:solidFill>
-                  <a:schemeClr val="dk1"/>
-                </a:solidFill>
-                <a:latin typeface="Calibri"/>
-                <a:ea typeface="Calibri"/>
-                <a:cs typeface="Calibri"/>
-                <a:sym typeface="Calibri"/>
-              </a:rPr>
-              <a:t>College of the Sequoias, &amp; </a:t>
-            </a:r>
-            <a:r>
-              <a:rPr lang="en-US" sz="2800" b="0" i="0" u="none" strike="noStrike" cap="none" baseline="0" dirty="0">
-                <a:solidFill>
-                  <a:schemeClr val="dk1"/>
-                </a:solidFill>
-                <a:latin typeface="Calibri"/>
-                <a:ea typeface="Calibri"/>
-                <a:cs typeface="Calibri"/>
-                <a:sym typeface="Calibri"/>
-              </a:rPr>
-              <a:t>California State University, Fresno </a:t>
-            </a:r>
-          </a:p>
-          <a:p>
-            <a:pPr marL="0" marR="0" lvl="0" indent="0" algn="ctr" rtl="0">
-              <a:lnSpc>
-                <a:spcPct val="100000"/>
-              </a:lnSpc>
-              <a:spcBef>
-                <a:spcPts val="0"/>
-              </a:spcBef>
-              <a:spcAft>
-                <a:spcPts val="0"/>
-              </a:spcAft>
-              <a:buClr>
-                <a:schemeClr val="dk1"/>
-              </a:buClr>
-              <a:buSzPct val="25000"/>
-              <a:buFont typeface="Calibri"/>
-              <a:buNone/>
-            </a:pPr>
-            <a:r>
-              <a:rPr lang="en-US" sz="2800" b="0" i="0" u="none" strike="noStrike" cap="none" baseline="30000" dirty="0">
-                <a:solidFill>
-                  <a:schemeClr val="dk1"/>
-                </a:solidFill>
-                <a:latin typeface="Calibri"/>
-                <a:ea typeface="Calibri"/>
-                <a:cs typeface="Calibri"/>
-                <a:sym typeface="Calibri"/>
-              </a:rPr>
-              <a:t>2</a:t>
-            </a:r>
-            <a:r>
-              <a:rPr lang="en-US" sz="2800" dirty="0">
-                <a:solidFill>
-                  <a:schemeClr val="dk1"/>
-                </a:solidFill>
-                <a:latin typeface="Calibri"/>
-                <a:ea typeface="Calibri"/>
-                <a:cs typeface="Calibri"/>
-                <a:sym typeface="Calibri"/>
-              </a:rPr>
-              <a:t>College of the Sequoias &amp; </a:t>
-            </a:r>
-            <a:r>
-              <a:rPr lang="en-US" sz="2800" b="0" i="0" u="none" strike="noStrike" cap="none" baseline="0" dirty="0">
-                <a:solidFill>
-                  <a:schemeClr val="dk1"/>
-                </a:solidFill>
-                <a:latin typeface="Calibri"/>
-                <a:ea typeface="Calibri"/>
-                <a:cs typeface="Calibri"/>
-                <a:sym typeface="Calibri"/>
-              </a:rPr>
-              <a:t>California State Polytechnic University, Pomona </a:t>
-            </a:r>
-          </a:p>
-          <a:p>
-            <a:pPr marL="0" marR="0" lvl="0" indent="0" algn="ctr" rtl="0">
-              <a:lnSpc>
-                <a:spcPct val="100000"/>
-              </a:lnSpc>
-              <a:spcBef>
-                <a:spcPts val="0"/>
-              </a:spcBef>
-              <a:spcAft>
-                <a:spcPts val="0"/>
-              </a:spcAft>
-              <a:buClr>
-                <a:schemeClr val="dk1"/>
-              </a:buClr>
-              <a:buSzPct val="25000"/>
-              <a:buFont typeface="Calibri"/>
-              <a:buNone/>
-            </a:pPr>
-            <a:r>
-              <a:rPr lang="en-US" sz="2800" b="0" i="0" u="none" strike="noStrike" cap="none" baseline="30000" dirty="0">
-                <a:solidFill>
-                  <a:schemeClr val="dk1"/>
-                </a:solidFill>
-                <a:latin typeface="Calibri"/>
-                <a:ea typeface="Calibri"/>
-                <a:cs typeface="Calibri"/>
-                <a:sym typeface="Calibri"/>
-              </a:rPr>
-              <a:t>3</a:t>
-            </a:r>
-            <a:r>
-              <a:rPr lang="en-US" sz="2800" b="0" i="0" u="none" strike="noStrike" cap="none" baseline="0" dirty="0">
-                <a:solidFill>
-                  <a:schemeClr val="dk1"/>
-                </a:solidFill>
-                <a:latin typeface="Calibri"/>
-                <a:ea typeface="Calibri"/>
-                <a:cs typeface="Calibri"/>
-                <a:sym typeface="Calibri"/>
-              </a:rPr>
-              <a:t>Natural Resources Conservation Service, United States Department of Agriculture </a:t>
-            </a:r>
           </a:p>
         </p:txBody>
       </p:sp>
@@ -17486,13 +17528,13 @@
               <a:t>This project required programming from the ground up using a </a:t>
             </a:r>
             <a:r>
-              <a:rPr lang="en-US" sz="3600" dirty="0" err="1">
+              <a:rPr lang="en-US" sz="3600" dirty="0" smtClean="0">
                 <a:latin typeface="Times New Roman" pitchFamily="18" charset="0"/>
                 <a:ea typeface="Calibri"/>
                 <a:cs typeface="Times New Roman" pitchFamily="18" charset="0"/>
                 <a:sym typeface="Calibri"/>
               </a:rPr>
-              <a:t>Javascript</a:t>
+              <a:t>JavaScript </a:t>
             </a:r>
             <a:r>
               <a:rPr lang="en-US" sz="3600" dirty="0">
@@ -17501,7 +17543,7 @@
                 <a:cs typeface="Times New Roman" pitchFamily="18" charset="0"/>
                 <a:sym typeface="Calibri"/>
               </a:rPr>
-              <a:t> game engine and mobile app compilers.  Design considerations required functionality on the Android operating system and the Chrome web browser.</a:t>
+              <a:t>game engine and mobile app compilers.  Design considerations required functionality on the Android operating system and the Chrome web browser.</a:t>
             </a:r>
           </a:p>
           <a:p>
@@ -17704,8 +17746,8 @@
         </p:nvSpPr>
         <p:spPr>
           <a:xfrm>
-            <a:off x="14025390" y="29020346"/>
-            <a:ext cx="29299390" cy="1107900"/>
+            <a:off x="14452588" y="29020346"/>
+            <a:ext cx="28872191" cy="1107900"/>
           </a:xfrm>
           <a:prstGeom prst="rect">
             <a:avLst/>
@@ -18056,8 +18098,8 @@
         </p:nvSpPr>
         <p:spPr>
           <a:xfrm>
-            <a:off x="14987762" y="18449305"/>
-            <a:ext cx="16635238" cy="1008162"/>
+            <a:off x="14452589" y="18449305"/>
+            <a:ext cx="17170411" cy="1008162"/>
           </a:xfrm>
           <a:prstGeom prst="rect">
             <a:avLst/>
@@ -18134,7 +18176,7 @@
           <p:nvPr>
             <p:extLst>
               <p:ext uri="{D42A27DB-BD31-4B8C-83A1-F6EECF244321}">
-                <p14:modId xmlns:p14="http://schemas.microsoft.com/office/powerpoint/2010/main" val="2878097088"/>
+                <p14:modId xmlns:p14="http://schemas.microsoft.com/office/powerpoint/2010/main" val="3353342540"/>
               </p:ext>
             </p:extLst>
           </p:nvPr>
@@ -18171,88 +18213,6 @@
           </a:graphicData>
         </a:graphic>
       </p:graphicFrame>
-      <p:pic>
-        <p:nvPicPr>
-          <p:cNvPr id="1029" name="Picture 5" descr="C:\Users\Ultrabook\Desktop\Surge Symposium\Game Table and Air Hockey\better 0.png"/>
-          <p:cNvPicPr>
-            <a:picLocks noChangeAspect="1" noChangeArrowheads="1"/>
-          </p:cNvPicPr>
-          <p:nvPr/>
-        </p:nvPicPr>
-        <p:blipFill>
-          <a:blip r:embed="rId16">
-            <a:extLst>
-              <a:ext uri="{28A0092B-C50C-407E-A947-70E740481C1C}">
-                <a14:useLocalDpi xmlns:a14="http://schemas.microsoft.com/office/drawing/2010/main" val="0"/>
-              </a:ext>
-            </a:extLst>
-          </a:blip>
-          <a:srcRect/>
-          <a:stretch>
-            <a:fillRect/>
-          </a:stretch>
-        </p:blipFill>
-        <p:spPr bwMode="auto">
-          <a:xfrm>
-            <a:off x="36884619" y="17915241"/>
-            <a:ext cx="5216151" cy="2474175"/>
-          </a:xfrm>
-          <a:prstGeom prst="rect">
-            <a:avLst/>
-          </a:prstGeom>
-          <a:noFill/>
-          <a:extLst>
-            <a:ext uri="{909E8E84-426E-40DD-AFC4-6F175D3DCCD1}">
-              <a14:hiddenFill xmlns:a14="http://schemas.microsoft.com/office/drawing/2010/main">
-                <a:solidFill>
-                  <a:srgbClr val="FFFFFF"/>
-                </a:solidFill>
-              </a14:hiddenFill>
-            </a:ext>
-          </a:extLst>
-        </p:spPr>
-      </p:pic>
-      <p:pic>
-        <p:nvPicPr>
-          <p:cNvPr id="1030" name="Picture 6" descr="C:\Users\Ultrabook\Desktop\Surge Symposium\Game Table and Air Hockey\better.png"/>
-          <p:cNvPicPr>
-            <a:picLocks noChangeAspect="1" noChangeArrowheads="1"/>
-          </p:cNvPicPr>
-          <p:nvPr/>
-        </p:nvPicPr>
-        <p:blipFill>
-          <a:blip r:embed="rId17">
-            <a:extLst>
-              <a:ext uri="{28A0092B-C50C-407E-A947-70E740481C1C}">
-                <a14:useLocalDpi xmlns:a14="http://schemas.microsoft.com/office/drawing/2010/main" val="0"/>
-              </a:ext>
-            </a:extLst>
-          </a:blip>
-          <a:srcRect/>
-          <a:stretch>
-            <a:fillRect/>
-          </a:stretch>
-        </p:blipFill>
-        <p:spPr bwMode="auto">
-          <a:xfrm>
-            <a:off x="36012893" y="6655917"/>
-            <a:ext cx="5346431" cy="2567285"/>
-          </a:xfrm>
-          <a:prstGeom prst="rect">
-            <a:avLst/>
-          </a:prstGeom>
-          <a:noFill/>
-          <a:extLst>
-            <a:ext uri="{909E8E84-426E-40DD-AFC4-6F175D3DCCD1}">
-              <a14:hiddenFill xmlns:a14="http://schemas.microsoft.com/office/drawing/2010/main">
-                <a:solidFill>
-                  <a:srgbClr val="FFFFFF"/>
-                </a:solidFill>
-              </a14:hiddenFill>
-            </a:ext>
-          </a:extLst>
-        </p:spPr>
-      </p:pic>
       <p:sp>
         <p:nvSpPr>
           <p:cNvPr id="33" name="TextBox 32"/>
@@ -18373,12 +18333,12 @@
               <a:t>Program a </a:t>
             </a:r>
             <a:r>
-              <a:rPr lang="en-US" sz="3600" dirty="0" err="1"/>
-              <a:t>singleplayer’s</a:t>
+              <a:rPr lang="en-US" sz="3600" dirty="0" smtClean="0"/>
+              <a:t>single player's </a:t>
             </a:r>
             <a:r>
               <a:rPr lang="en-US" sz="3600" dirty="0"/>
-              <a:t> AI with difficulty levels.</a:t>
+              <a:t>AI with difficulty levels.</a:t>
             </a:r>
           </a:p>
           <a:p>
@@ -18462,54 +18422,6 @@
           </a:p>
         </p:txBody>
       </p:sp>
-      <p:pic>
-        <p:nvPicPr>
-          <p:cNvPr id="5" name="Picture 4"/>
-          <p:cNvPicPr>
-            <a:picLocks noChangeAspect="1"/>
-          </p:cNvPicPr>
-          <p:nvPr/>
-        </p:nvPicPr>
-        <p:blipFill>
-          <a:blip r:embed="rId18"/>
-          <a:stretch>
-            <a:fillRect/>
-          </a:stretch>
-        </p:blipFill>
-        <p:spPr>
-          <a:xfrm>
-            <a:off x="32042370" y="20195898"/>
-            <a:ext cx="10058400" cy="4911328"/>
-          </a:xfrm>
-          <a:prstGeom prst="rect">
-            <a:avLst/>
-          </a:prstGeom>
-        </p:spPr>
-      </p:pic>
-      <p:pic>
-        <p:nvPicPr>
-          <p:cNvPr id="6" name="Picture 5"/>
-          <p:cNvPicPr>
-            <a:picLocks noChangeAspect="1"/>
-          </p:cNvPicPr>
-          <p:nvPr/>
-        </p:nvPicPr>
-        <p:blipFill>
-          <a:blip r:embed="rId19"/>
-          <a:stretch>
-            <a:fillRect/>
-          </a:stretch>
-        </p:blipFill>
-        <p:spPr>
-          <a:xfrm>
-            <a:off x="36738289" y="25011107"/>
-            <a:ext cx="4143375" cy="2152650"/>
-          </a:xfrm>
-          <a:prstGeom prst="rect">
-            <a:avLst/>
-          </a:prstGeom>
-        </p:spPr>
-      </p:pic>
       <p:sp>
         <p:nvSpPr>
           <p:cNvPr id="7" name="Rectangle 6"/>
@@ -18574,26 +18486,544 @@
       </p:sp>
       <p:pic>
         <p:nvPicPr>
-          <p:cNvPr id="9" name="Picture 8"/>
+          <p:cNvPr id="3" name="Picture 2" descr="C:\Users\core 2\Documents\GitHub\AirHockeySurge\www\asset\RedPuck_ooohShiny.png"/>
           <p:cNvPicPr>
-            <a:picLocks noChangeAspect="1"/>
+            <a:picLocks noChangeAspect="1" noChangeArrowheads="1"/>
           </p:cNvPicPr>
           <p:nvPr/>
         </p:nvPicPr>
         <p:blipFill>
-          <a:blip r:embed="rId20"/>
+          <a:blip r:embed="rId16">
+            <a:extLst>
+              <a:ext uri="{28A0092B-C50C-407E-A947-70E740481C1C}">
+                <a14:useLocalDpi xmlns:a14="http://schemas.microsoft.com/office/drawing/2010/main" val="0"/>
+              </a:ext>
+            </a:extLst>
+          </a:blip>
+          <a:srcRect/>
           <a:stretch>
             <a:fillRect/>
           </a:stretch>
         </p:blipFill>
-        <p:spPr>
-          <a:xfrm rot="998579">
-            <a:off x="35900184" y="9440255"/>
-            <a:ext cx="5202468" cy="7730867"/>
+        <p:spPr bwMode="auto">
+          <a:xfrm>
+            <a:off x="14786033" y="21623010"/>
+            <a:ext cx="779790" cy="779790"/>
           </a:xfrm>
           <a:prstGeom prst="rect">
             <a:avLst/>
           </a:prstGeom>
+          <a:noFill/>
+          <a:extLst>
+            <a:ext uri="{909E8E84-426E-40DD-AFC4-6F175D3DCCD1}">
+              <a14:hiddenFill xmlns:a14="http://schemas.microsoft.com/office/drawing/2010/main">
+                <a:solidFill>
+                  <a:srgbClr val="FFFFFF"/>
+                </a:solidFill>
+              </a14:hiddenFill>
+            </a:ext>
+          </a:extLst>
+        </p:spPr>
+      </p:pic>
+      <p:pic>
+        <p:nvPicPr>
+          <p:cNvPr id="1027" name="Picture 3" descr="C:\Users\core 2\Desktop\aaaaaaaaaaaaaaaaaa\done-sample.png"/>
+          <p:cNvPicPr>
+            <a:picLocks noChangeAspect="1" noChangeArrowheads="1"/>
+          </p:cNvPicPr>
+          <p:nvPr/>
+        </p:nvPicPr>
+        <p:blipFill>
+          <a:blip r:embed="rId17">
+            <a:extLst>
+              <a:ext uri="{28A0092B-C50C-407E-A947-70E740481C1C}">
+                <a14:useLocalDpi xmlns:a14="http://schemas.microsoft.com/office/drawing/2010/main" val="0"/>
+              </a:ext>
+            </a:extLst>
+          </a:blip>
+          <a:srcRect/>
+          <a:stretch>
+            <a:fillRect/>
+          </a:stretch>
+        </p:blipFill>
+        <p:spPr bwMode="auto">
+          <a:xfrm>
+            <a:off x="33643655" y="19401703"/>
+            <a:ext cx="4151545" cy="5591897"/>
+          </a:xfrm>
+          <a:prstGeom prst="rect">
+            <a:avLst/>
+          </a:prstGeom>
+          <a:noFill/>
+          <a:extLst>
+            <a:ext uri="{909E8E84-426E-40DD-AFC4-6F175D3DCCD1}">
+              <a14:hiddenFill xmlns:a14="http://schemas.microsoft.com/office/drawing/2010/main">
+                <a:solidFill>
+                  <a:srgbClr val="FFFFFF"/>
+                </a:solidFill>
+              </a14:hiddenFill>
+            </a:ext>
+          </a:extLst>
+        </p:spPr>
+      </p:pic>
+      <p:pic>
+        <p:nvPicPr>
+          <p:cNvPr id="1028" name="Picture 4" descr="C:\Users\core 2\Desktop\aaaaaaaaaaaaaaaaaa\table2asdfsa.png"/>
+          <p:cNvPicPr>
+            <a:picLocks noChangeAspect="1" noChangeArrowheads="1"/>
+          </p:cNvPicPr>
+          <p:nvPr/>
+        </p:nvPicPr>
+        <p:blipFill>
+          <a:blip r:embed="rId18">
+            <a:extLst>
+              <a:ext uri="{28A0092B-C50C-407E-A947-70E740481C1C}">
+                <a14:useLocalDpi xmlns:a14="http://schemas.microsoft.com/office/drawing/2010/main" val="0"/>
+              </a:ext>
+            </a:extLst>
+          </a:blip>
+          <a:srcRect/>
+          <a:stretch>
+            <a:fillRect/>
+          </a:stretch>
+        </p:blipFill>
+        <p:spPr bwMode="auto">
+          <a:xfrm>
+            <a:off x="34932937" y="7924800"/>
+            <a:ext cx="7205663" cy="8905875"/>
+          </a:xfrm>
+          <a:prstGeom prst="rect">
+            <a:avLst/>
+          </a:prstGeom>
+          <a:noFill/>
+          <a:extLst>
+            <a:ext uri="{909E8E84-426E-40DD-AFC4-6F175D3DCCD1}">
+              <a14:hiddenFill xmlns:a14="http://schemas.microsoft.com/office/drawing/2010/main">
+                <a:solidFill>
+                  <a:srgbClr val="FFFFFF"/>
+                </a:solidFill>
+              </a14:hiddenFill>
+            </a:ext>
+          </a:extLst>
+        </p:spPr>
+      </p:pic>
+      <p:pic>
+        <p:nvPicPr>
+          <p:cNvPr id="4" name="Picture 5" descr="C:\Users\core 2\Desktop\aaaaaaaaaaaaaaaaaa\menu.PNG"/>
+          <p:cNvPicPr>
+            <a:picLocks noChangeAspect="1" noChangeArrowheads="1"/>
+          </p:cNvPicPr>
+          <p:nvPr/>
+        </p:nvPicPr>
+        <p:blipFill>
+          <a:blip r:embed="rId19">
+            <a:extLst>
+              <a:ext uri="{28A0092B-C50C-407E-A947-70E740481C1C}">
+                <a14:useLocalDpi xmlns:a14="http://schemas.microsoft.com/office/drawing/2010/main" val="0"/>
+              </a:ext>
+            </a:extLst>
+          </a:blip>
+          <a:srcRect/>
+          <a:stretch>
+            <a:fillRect/>
+          </a:stretch>
+        </p:blipFill>
+        <p:spPr bwMode="auto">
+          <a:xfrm rot="675147">
+            <a:off x="38518116" y="17560292"/>
+            <a:ext cx="2824048" cy="4664075"/>
+          </a:xfrm>
+          <a:prstGeom prst="rect">
+            <a:avLst/>
+          </a:prstGeom>
+          <a:ln>
+            <a:noFill/>
+          </a:ln>
+          <a:effectLst>
+            <a:outerShdw blurRad="190500" algn="tl" rotWithShape="0">
+              <a:srgbClr val="000000">
+                <a:alpha val="70000"/>
+              </a:srgbClr>
+            </a:outerShdw>
+          </a:effectLst>
+          <a:extLst>
+            <a:ext uri="{909E8E84-426E-40DD-AFC4-6F175D3DCCD1}">
+              <a14:hiddenFill xmlns:a14="http://schemas.microsoft.com/office/drawing/2010/main">
+                <a:solidFill>
+                  <a:srgbClr val="FFFFFF"/>
+                </a:solidFill>
+              </a14:hiddenFill>
+            </a:ext>
+          </a:extLst>
+        </p:spPr>
+      </p:pic>
+      <p:pic>
+        <p:nvPicPr>
+          <p:cNvPr id="10" name="Picture 6" descr="C:\Users\core 2\Desktop\aaaaaaaaaaaaaaaaaa\browser thingy.PNG"/>
+          <p:cNvPicPr>
+            <a:picLocks noChangeAspect="1" noChangeArrowheads="1"/>
+          </p:cNvPicPr>
+          <p:nvPr/>
+        </p:nvPicPr>
+        <p:blipFill>
+          <a:blip r:embed="rId20">
+            <a:extLst>
+              <a:ext uri="{28A0092B-C50C-407E-A947-70E740481C1C}">
+                <a14:useLocalDpi xmlns:a14="http://schemas.microsoft.com/office/drawing/2010/main" val="0"/>
+              </a:ext>
+            </a:extLst>
+          </a:blip>
+          <a:srcRect/>
+          <a:stretch>
+            <a:fillRect/>
+          </a:stretch>
+        </p:blipFill>
+        <p:spPr bwMode="auto">
+          <a:xfrm>
+            <a:off x="31623001" y="25298400"/>
+            <a:ext cx="11811000" cy="1334696"/>
+          </a:xfrm>
+          <a:prstGeom prst="rect">
+            <a:avLst/>
+          </a:prstGeom>
+          <a:noFill/>
+          <a:extLst>
+            <a:ext uri="{909E8E84-426E-40DD-AFC4-6F175D3DCCD1}">
+              <a14:hiddenFill xmlns:a14="http://schemas.microsoft.com/office/drawing/2010/main">
+                <a:solidFill>
+                  <a:srgbClr val="FFFFFF"/>
+                </a:solidFill>
+              </a14:hiddenFill>
+            </a:ext>
+          </a:extLst>
+        </p:spPr>
+      </p:pic>
+      <p:pic>
+        <p:nvPicPr>
+          <p:cNvPr id="28" name="Picture 27" descr="C:\Users\core 2\Documents\GitHub\AirHockeySurge\www\asset\RedPuck_ooohShiny.png"/>
+          <p:cNvPicPr>
+            <a:picLocks noChangeAspect="1" noChangeArrowheads="1"/>
+          </p:cNvPicPr>
+          <p:nvPr/>
+        </p:nvPicPr>
+        <p:blipFill>
+          <a:blip r:embed="rId16">
+            <a:extLst>
+              <a:ext uri="{28A0092B-C50C-407E-A947-70E740481C1C}">
+                <a14:useLocalDpi xmlns:a14="http://schemas.microsoft.com/office/drawing/2010/main" val="0"/>
+              </a:ext>
+            </a:extLst>
+          </a:blip>
+          <a:srcRect/>
+          <a:stretch>
+            <a:fillRect/>
+          </a:stretch>
+        </p:blipFill>
+        <p:spPr bwMode="auto">
+          <a:xfrm>
+            <a:off x="14782800" y="22250400"/>
+            <a:ext cx="779790" cy="779790"/>
+          </a:xfrm>
+          <a:prstGeom prst="rect">
+            <a:avLst/>
+          </a:prstGeom>
+          <a:noFill/>
+          <a:extLst>
+            <a:ext uri="{909E8E84-426E-40DD-AFC4-6F175D3DCCD1}">
+              <a14:hiddenFill xmlns:a14="http://schemas.microsoft.com/office/drawing/2010/main">
+                <a:solidFill>
+                  <a:srgbClr val="FFFFFF"/>
+                </a:solidFill>
+              </a14:hiddenFill>
+            </a:ext>
+          </a:extLst>
+        </p:spPr>
+      </p:pic>
+      <p:pic>
+        <p:nvPicPr>
+          <p:cNvPr id="29" name="Picture 28" descr="C:\Users\core 2\Documents\GitHub\AirHockeySurge\www\asset\RedPuck_ooohShiny.png"/>
+          <p:cNvPicPr>
+            <a:picLocks noChangeAspect="1" noChangeArrowheads="1"/>
+          </p:cNvPicPr>
+          <p:nvPr/>
+        </p:nvPicPr>
+        <p:blipFill>
+          <a:blip r:embed="rId16">
+            <a:extLst>
+              <a:ext uri="{28A0092B-C50C-407E-A947-70E740481C1C}">
+                <a14:useLocalDpi xmlns:a14="http://schemas.microsoft.com/office/drawing/2010/main" val="0"/>
+              </a:ext>
+            </a:extLst>
+          </a:blip>
+          <a:srcRect/>
+          <a:stretch>
+            <a:fillRect/>
+          </a:stretch>
+        </p:blipFill>
+        <p:spPr bwMode="auto">
+          <a:xfrm>
+            <a:off x="14782800" y="22842210"/>
+            <a:ext cx="779790" cy="779790"/>
+          </a:xfrm>
+          <a:prstGeom prst="rect">
+            <a:avLst/>
+          </a:prstGeom>
+          <a:noFill/>
+          <a:extLst>
+            <a:ext uri="{909E8E84-426E-40DD-AFC4-6F175D3DCCD1}">
+              <a14:hiddenFill xmlns:a14="http://schemas.microsoft.com/office/drawing/2010/main">
+                <a:solidFill>
+                  <a:srgbClr val="FFFFFF"/>
+                </a:solidFill>
+              </a14:hiddenFill>
+            </a:ext>
+          </a:extLst>
+        </p:spPr>
+      </p:pic>
+      <p:pic>
+        <p:nvPicPr>
+          <p:cNvPr id="30" name="Picture 29" descr="C:\Users\core 2\Documents\GitHub\AirHockeySurge\www\asset\RedPuck_ooohShiny.png"/>
+          <p:cNvPicPr>
+            <a:picLocks noChangeAspect="1" noChangeArrowheads="1"/>
+          </p:cNvPicPr>
+          <p:nvPr/>
+        </p:nvPicPr>
+        <p:blipFill>
+          <a:blip r:embed="rId16">
+            <a:extLst>
+              <a:ext uri="{28A0092B-C50C-407E-A947-70E740481C1C}">
+                <a14:useLocalDpi xmlns:a14="http://schemas.microsoft.com/office/drawing/2010/main" val="0"/>
+              </a:ext>
+            </a:extLst>
+          </a:blip>
+          <a:srcRect/>
+          <a:stretch>
+            <a:fillRect/>
+          </a:stretch>
+        </p:blipFill>
+        <p:spPr bwMode="auto">
+          <a:xfrm>
+            <a:off x="14782800" y="24061410"/>
+            <a:ext cx="779790" cy="779790"/>
+          </a:xfrm>
+          <a:prstGeom prst="rect">
+            <a:avLst/>
+          </a:prstGeom>
+          <a:noFill/>
+          <a:extLst>
+            <a:ext uri="{909E8E84-426E-40DD-AFC4-6F175D3DCCD1}">
+              <a14:hiddenFill xmlns:a14="http://schemas.microsoft.com/office/drawing/2010/main">
+                <a:solidFill>
+                  <a:srgbClr val="FFFFFF"/>
+                </a:solidFill>
+              </a14:hiddenFill>
+            </a:ext>
+          </a:extLst>
+        </p:spPr>
+      </p:pic>
+      <p:pic>
+        <p:nvPicPr>
+          <p:cNvPr id="31" name="Picture 30" descr="C:\Users\core 2\Documents\GitHub\AirHockeySurge\www\asset\RedPuck_ooohShiny.png"/>
+          <p:cNvPicPr>
+            <a:picLocks noChangeAspect="1" noChangeArrowheads="1"/>
+          </p:cNvPicPr>
+          <p:nvPr/>
+        </p:nvPicPr>
+        <p:blipFill>
+          <a:blip r:embed="rId16">
+            <a:extLst>
+              <a:ext uri="{28A0092B-C50C-407E-A947-70E740481C1C}">
+                <a14:useLocalDpi xmlns:a14="http://schemas.microsoft.com/office/drawing/2010/main" val="0"/>
+              </a:ext>
+            </a:extLst>
+          </a:blip>
+          <a:srcRect/>
+          <a:stretch>
+            <a:fillRect/>
+          </a:stretch>
+        </p:blipFill>
+        <p:spPr bwMode="auto">
+          <a:xfrm>
+            <a:off x="14782800" y="24671010"/>
+            <a:ext cx="779790" cy="779790"/>
+          </a:xfrm>
+          <a:prstGeom prst="rect">
+            <a:avLst/>
+          </a:prstGeom>
+          <a:noFill/>
+          <a:extLst>
+            <a:ext uri="{909E8E84-426E-40DD-AFC4-6F175D3DCCD1}">
+              <a14:hiddenFill xmlns:a14="http://schemas.microsoft.com/office/drawing/2010/main">
+                <a:solidFill>
+                  <a:srgbClr val="FFFFFF"/>
+                </a:solidFill>
+              </a14:hiddenFill>
+            </a:ext>
+          </a:extLst>
+        </p:spPr>
+      </p:pic>
+      <p:pic>
+        <p:nvPicPr>
+          <p:cNvPr id="34" name="Picture 33" descr="C:\Users\core 2\Documents\GitHub\AirHockeySurge\www\asset\RedPuck_ooohShiny.png"/>
+          <p:cNvPicPr>
+            <a:picLocks noChangeAspect="1" noChangeArrowheads="1"/>
+          </p:cNvPicPr>
+          <p:nvPr/>
+        </p:nvPicPr>
+        <p:blipFill>
+          <a:blip r:embed="rId16">
+            <a:extLst>
+              <a:ext uri="{28A0092B-C50C-407E-A947-70E740481C1C}">
+                <a14:useLocalDpi xmlns:a14="http://schemas.microsoft.com/office/drawing/2010/main" val="0"/>
+              </a:ext>
+            </a:extLst>
+          </a:blip>
+          <a:srcRect/>
+          <a:stretch>
+            <a:fillRect/>
+          </a:stretch>
+        </p:blipFill>
+        <p:spPr bwMode="auto">
+          <a:xfrm>
+            <a:off x="14782800" y="25298400"/>
+            <a:ext cx="779790" cy="779790"/>
+          </a:xfrm>
+          <a:prstGeom prst="rect">
+            <a:avLst/>
+          </a:prstGeom>
+          <a:noFill/>
+          <a:extLst>
+            <a:ext uri="{909E8E84-426E-40DD-AFC4-6F175D3DCCD1}">
+              <a14:hiddenFill xmlns:a14="http://schemas.microsoft.com/office/drawing/2010/main">
+                <a:solidFill>
+                  <a:srgbClr val="FFFFFF"/>
+                </a:solidFill>
+              </a14:hiddenFill>
+            </a:ext>
+          </a:extLst>
+        </p:spPr>
+      </p:pic>
+      <p:pic>
+        <p:nvPicPr>
+          <p:cNvPr id="35" name="Picture 34" descr="C:\Users\core 2\Documents\GitHub\AirHockeySurge\www\asset\RedPuck_ooohShiny.png"/>
+          <p:cNvPicPr>
+            <a:picLocks noChangeAspect="1" noChangeArrowheads="1"/>
+          </p:cNvPicPr>
+          <p:nvPr/>
+        </p:nvPicPr>
+        <p:blipFill>
+          <a:blip r:embed="rId16">
+            <a:extLst>
+              <a:ext uri="{28A0092B-C50C-407E-A947-70E740481C1C}">
+                <a14:useLocalDpi xmlns:a14="http://schemas.microsoft.com/office/drawing/2010/main" val="0"/>
+              </a:ext>
+            </a:extLst>
+          </a:blip>
+          <a:srcRect/>
+          <a:stretch>
+            <a:fillRect/>
+          </a:stretch>
+        </p:blipFill>
+        <p:spPr bwMode="auto">
+          <a:xfrm>
+            <a:off x="14782800" y="25966410"/>
+            <a:ext cx="779790" cy="779790"/>
+          </a:xfrm>
+          <a:prstGeom prst="rect">
+            <a:avLst/>
+          </a:prstGeom>
+          <a:noFill/>
+          <a:extLst>
+            <a:ext uri="{909E8E84-426E-40DD-AFC4-6F175D3DCCD1}">
+              <a14:hiddenFill xmlns:a14="http://schemas.microsoft.com/office/drawing/2010/main">
+                <a:solidFill>
+                  <a:srgbClr val="FFFFFF"/>
+                </a:solidFill>
+              </a14:hiddenFill>
+            </a:ext>
+          </a:extLst>
+        </p:spPr>
+      </p:pic>
+      <p:pic>
+        <p:nvPicPr>
+          <p:cNvPr id="37" name="Picture 36" descr="C:\Users\core 2\Documents\GitHub\AirHockeySurge\www\asset\RedPuck_ooohShiny.png"/>
+          <p:cNvPicPr>
+            <a:picLocks noChangeAspect="1" noChangeArrowheads="1"/>
+          </p:cNvPicPr>
+          <p:nvPr/>
+        </p:nvPicPr>
+        <p:blipFill>
+          <a:blip r:embed="rId16">
+            <a:extLst>
+              <a:ext uri="{28A0092B-C50C-407E-A947-70E740481C1C}">
+                <a14:useLocalDpi xmlns:a14="http://schemas.microsoft.com/office/drawing/2010/main" val="0"/>
+              </a:ext>
+            </a:extLst>
+          </a:blip>
+          <a:srcRect/>
+          <a:stretch>
+            <a:fillRect/>
+          </a:stretch>
+        </p:blipFill>
+        <p:spPr bwMode="auto">
+          <a:xfrm>
+            <a:off x="14782800" y="21031200"/>
+            <a:ext cx="779790" cy="779790"/>
+          </a:xfrm>
+          <a:prstGeom prst="rect">
+            <a:avLst/>
+          </a:prstGeom>
+          <a:noFill/>
+          <a:extLst>
+            <a:ext uri="{909E8E84-426E-40DD-AFC4-6F175D3DCCD1}">
+              <a14:hiddenFill xmlns:a14="http://schemas.microsoft.com/office/drawing/2010/main">
+                <a:solidFill>
+                  <a:srgbClr val="FFFFFF"/>
+                </a:solidFill>
+              </a14:hiddenFill>
+            </a:ext>
+          </a:extLst>
+        </p:spPr>
+      </p:pic>
+      <p:pic>
+        <p:nvPicPr>
+          <p:cNvPr id="38" name="Picture 3" descr="C:\Users\Ultrabook\Desktop\Surge Symposium\Game Table and Air Hockey\BluePuck_ooohShiny.png"/>
+          <p:cNvPicPr>
+            <a:picLocks noChangeAspect="1" noChangeArrowheads="1"/>
+          </p:cNvPicPr>
+          <p:nvPr/>
+        </p:nvPicPr>
+        <p:blipFill>
+          <a:blip r:embed="rId5">
+            <a:extLst>
+              <a:ext uri="{28A0092B-C50C-407E-A947-70E740481C1C}">
+                <a14:useLocalDpi xmlns:a14="http://schemas.microsoft.com/office/drawing/2010/main" val="0"/>
+              </a:ext>
+            </a:extLst>
+          </a:blip>
+          <a:srcRect/>
+          <a:stretch>
+            <a:fillRect/>
+          </a:stretch>
+        </p:blipFill>
+        <p:spPr bwMode="auto">
+          <a:xfrm>
+            <a:off x="14755947" y="27099126"/>
+            <a:ext cx="809876" cy="809876"/>
+          </a:xfrm>
+          <a:prstGeom prst="rect">
+            <a:avLst/>
+          </a:prstGeom>
+          <a:noFill/>
+          <a:extLst>
+            <a:ext uri="{909E8E84-426E-40DD-AFC4-6F175D3DCCD1}">
+              <a14:hiddenFill xmlns:a14="http://schemas.microsoft.com/office/drawing/2010/main">
+                <a:solidFill>
+                  <a:srgbClr val="FFFFFF"/>
+                </a:solidFill>
+              </a14:hiddenFill>
+            </a:ext>
+          </a:extLst>
         </p:spPr>
       </p:pic>
     </p:spTree>

</xml_diff>